<commit_message>
up arrow bug fixed.  updated the backspace to delete content depending on pointer location.
still has a bug when comparing working ptr to previous saved ptr in '\n' handler
</commit_message>
<xml_diff>
--- a/Resources/Systems Eng/UI FIFO Archictecture.pptx
+++ b/Resources/Systems Eng/UI FIFO Archictecture.pptx
@@ -8,6 +8,7 @@
     <p:sldId id="256" r:id="rId2"/>
     <p:sldId id="257" r:id="rId3"/>
     <p:sldId id="258" r:id="rId4"/>
+    <p:sldId id="259" r:id="rId5"/>
   </p:sldIdLst>
   <p:sldSz cx="12192000" cy="6858000"/>
   <p:notesSz cx="6858000" cy="9144000"/>
@@ -106,6 +107,11 @@
       </a:defRPr>
     </a:lvl9pPr>
   </p:defaultTextStyle>
+  <p:extLst>
+    <p:ext uri="{EFAFB233-063F-42B5-8137-9DF3F51BA10A}">
+      <p15:sldGuideLst xmlns:p15="http://schemas.microsoft.com/office/powerpoint/2012/main"/>
+    </p:ext>
+  </p:extLst>
 </p:presentation>
 </file>
 
@@ -240,7 +246,7 @@
           <a:p>
             <a:fld id="{823BE3C3-D861-44B5-ABA1-8C3A1D4F0455}" type="datetimeFigureOut">
               <a:rPr lang="en-US" smtClean="0"/>
-              <a:t>9/7/2015</a:t>
+              <a:t>9/12/2015</a:t>
             </a:fld>
             <a:endParaRPr lang="en-US"/>
           </a:p>
@@ -410,7 +416,7 @@
           <a:p>
             <a:fld id="{823BE3C3-D861-44B5-ABA1-8C3A1D4F0455}" type="datetimeFigureOut">
               <a:rPr lang="en-US" smtClean="0"/>
-              <a:t>9/7/2015</a:t>
+              <a:t>9/12/2015</a:t>
             </a:fld>
             <a:endParaRPr lang="en-US"/>
           </a:p>
@@ -590,7 +596,7 @@
           <a:p>
             <a:fld id="{823BE3C3-D861-44B5-ABA1-8C3A1D4F0455}" type="datetimeFigureOut">
               <a:rPr lang="en-US" smtClean="0"/>
-              <a:t>9/7/2015</a:t>
+              <a:t>9/12/2015</a:t>
             </a:fld>
             <a:endParaRPr lang="en-US"/>
           </a:p>
@@ -760,7 +766,7 @@
           <a:p>
             <a:fld id="{823BE3C3-D861-44B5-ABA1-8C3A1D4F0455}" type="datetimeFigureOut">
               <a:rPr lang="en-US" smtClean="0"/>
-              <a:t>9/7/2015</a:t>
+              <a:t>9/12/2015</a:t>
             </a:fld>
             <a:endParaRPr lang="en-US"/>
           </a:p>
@@ -1006,7 +1012,7 @@
           <a:p>
             <a:fld id="{823BE3C3-D861-44B5-ABA1-8C3A1D4F0455}" type="datetimeFigureOut">
               <a:rPr lang="en-US" smtClean="0"/>
-              <a:t>9/7/2015</a:t>
+              <a:t>9/12/2015</a:t>
             </a:fld>
             <a:endParaRPr lang="en-US"/>
           </a:p>
@@ -1238,7 +1244,7 @@
           <a:p>
             <a:fld id="{823BE3C3-D861-44B5-ABA1-8C3A1D4F0455}" type="datetimeFigureOut">
               <a:rPr lang="en-US" smtClean="0"/>
-              <a:t>9/7/2015</a:t>
+              <a:t>9/12/2015</a:t>
             </a:fld>
             <a:endParaRPr lang="en-US"/>
           </a:p>
@@ -1605,7 +1611,7 @@
           <a:p>
             <a:fld id="{823BE3C3-D861-44B5-ABA1-8C3A1D4F0455}" type="datetimeFigureOut">
               <a:rPr lang="en-US" smtClean="0"/>
-              <a:t>9/7/2015</a:t>
+              <a:t>9/12/2015</a:t>
             </a:fld>
             <a:endParaRPr lang="en-US"/>
           </a:p>
@@ -1723,7 +1729,7 @@
           <a:p>
             <a:fld id="{823BE3C3-D861-44B5-ABA1-8C3A1D4F0455}" type="datetimeFigureOut">
               <a:rPr lang="en-US" smtClean="0"/>
-              <a:t>9/7/2015</a:t>
+              <a:t>9/12/2015</a:t>
             </a:fld>
             <a:endParaRPr lang="en-US"/>
           </a:p>
@@ -1818,7 +1824,7 @@
           <a:p>
             <a:fld id="{823BE3C3-D861-44B5-ABA1-8C3A1D4F0455}" type="datetimeFigureOut">
               <a:rPr lang="en-US" smtClean="0"/>
-              <a:t>9/7/2015</a:t>
+              <a:t>9/12/2015</a:t>
             </a:fld>
             <a:endParaRPr lang="en-US"/>
           </a:p>
@@ -2095,7 +2101,7 @@
           <a:p>
             <a:fld id="{823BE3C3-D861-44B5-ABA1-8C3A1D4F0455}" type="datetimeFigureOut">
               <a:rPr lang="en-US" smtClean="0"/>
-              <a:t>9/7/2015</a:t>
+              <a:t>9/12/2015</a:t>
             </a:fld>
             <a:endParaRPr lang="en-US"/>
           </a:p>
@@ -2348,7 +2354,7 @@
           <a:p>
             <a:fld id="{823BE3C3-D861-44B5-ABA1-8C3A1D4F0455}" type="datetimeFigureOut">
               <a:rPr lang="en-US" smtClean="0"/>
-              <a:t>9/7/2015</a:t>
+              <a:t>9/12/2015</a:t>
             </a:fld>
             <a:endParaRPr lang="en-US"/>
           </a:p>
@@ -2561,7 +2567,7 @@
           <a:p>
             <a:fld id="{823BE3C3-D861-44B5-ABA1-8C3A1D4F0455}" type="datetimeFigureOut">
               <a:rPr lang="en-US" smtClean="0"/>
-              <a:t>9/7/2015</a:t>
+              <a:t>9/12/2015</a:t>
             </a:fld>
             <a:endParaRPr lang="en-US"/>
           </a:p>
@@ -5852,6 +5858,91 @@
 </p:sld>
 </file>
 
+<file path=ppt/slides/slide4.xml><?xml version="1.0" encoding="utf-8"?>
+<p:sld xmlns:a="http://schemas.openxmlformats.org/drawingml/2006/main" xmlns:r="http://schemas.openxmlformats.org/officeDocument/2006/relationships" xmlns:p="http://schemas.openxmlformats.org/presentationml/2006/main">
+  <p:cSld>
+    <p:spTree>
+      <p:nvGrpSpPr>
+        <p:cNvPr id="1" name=""/>
+        <p:cNvGrpSpPr/>
+        <p:nvPr/>
+      </p:nvGrpSpPr>
+      <p:grpSpPr>
+        <a:xfrm>
+          <a:off x="0" y="0"/>
+          <a:ext cx="0" cy="0"/>
+          <a:chOff x="0" y="0"/>
+          <a:chExt cx="0" cy="0"/>
+        </a:xfrm>
+      </p:grpSpPr>
+      <p:sp>
+        <p:nvSpPr>
+          <p:cNvPr id="2" name="Title 1"/>
+          <p:cNvSpPr>
+            <a:spLocks noGrp="1"/>
+          </p:cNvSpPr>
+          <p:nvPr>
+            <p:ph type="title"/>
+          </p:nvPr>
+        </p:nvSpPr>
+        <p:spPr/>
+        <p:txBody>
+          <a:bodyPr/>
+          <a:lstStyle/>
+          <a:p>
+            <a:endParaRPr lang="en-US"/>
+          </a:p>
+        </p:txBody>
+      </p:sp>
+      <p:sp>
+        <p:nvSpPr>
+          <p:cNvPr id="3" name="TextBox 2"/>
+          <p:cNvSpPr txBox="1"/>
+          <p:nvPr/>
+        </p:nvSpPr>
+        <p:spPr>
+          <a:xfrm>
+            <a:off x="2545492" y="2117124"/>
+            <a:ext cx="5261890" cy="646331"/>
+          </a:xfrm>
+          <a:prstGeom prst="rect">
+            <a:avLst/>
+          </a:prstGeom>
+          <a:noFill/>
+        </p:spPr>
+        <p:txBody>
+          <a:bodyPr wrap="none" rtlCol="0">
+            <a:spAutoFit/>
+          </a:bodyPr>
+          <a:lstStyle/>
+          <a:p>
+            <a:r>
+              <a:rPr lang="en-US" dirty="0" smtClean="0"/>
+              <a:t>Arguments within array will be delimited by spacebars</a:t>
+            </a:r>
+          </a:p>
+          <a:p>
+            <a:r>
+              <a:rPr lang="en-US" dirty="0" smtClean="0"/>
+              <a:t>Command will be terminated by NULL \0</a:t>
+            </a:r>
+            <a:endParaRPr lang="en-US" dirty="0"/>
+          </a:p>
+        </p:txBody>
+      </p:sp>
+    </p:spTree>
+    <p:extLst>
+      <p:ext uri="{BB962C8B-B14F-4D97-AF65-F5344CB8AC3E}">
+        <p14:creationId xmlns:p14="http://schemas.microsoft.com/office/powerpoint/2010/main" val="2398330223"/>
+      </p:ext>
+    </p:extLst>
+  </p:cSld>
+  <p:clrMapOvr>
+    <a:masterClrMapping/>
+  </p:clrMapOvr>
+</p:sld>
+</file>
+
 <file path=ppt/theme/theme1.xml><?xml version="1.0" encoding="utf-8"?>
 <a:theme xmlns:a="http://schemas.openxmlformats.org/drawingml/2006/main" name="Office Theme">
   <a:themeElements>

</xml_diff>